<commit_message>
smv : update smoke triangulation figure
</commit_message>
<xml_diff>
--- a/smv/figures/smokegeom_triangulation.pptx
+++ b/smv/figures/smokegeom_triangulation.pptx
@@ -104,6 +104,11 @@
       </a:defRPr>
     </a:lvl9pPr>
   </p:defaultTextStyle>
+  <p:extLst>
+    <p:ext uri="{EFAFB233-063F-42B5-8137-9DF3F51BA10A}">
+      <p15:sldGuideLst xmlns:p15="http://schemas.microsoft.com/office/powerpoint/2012/main"/>
+    </p:ext>
+  </p:extLst>
 </p:presentation>
 </file>
 
@@ -3381,7 +3386,7 @@
         </p:nvCxnSpPr>
         <p:spPr>
           <a:xfrm flipH="1">
-            <a:off x="4539727" y="642657"/>
+            <a:off x="4356845" y="266136"/>
             <a:ext cx="45720" cy="1613647"/>
           </a:xfrm>
           <a:prstGeom prst="straightConnector1">
@@ -3422,7 +3427,7 @@
         </p:nvCxnSpPr>
         <p:spPr>
           <a:xfrm>
-            <a:off x="4578159" y="649280"/>
+            <a:off x="4395277" y="283517"/>
             <a:ext cx="2053534" cy="0"/>
           </a:xfrm>
           <a:prstGeom prst="straightConnector1">
@@ -3461,7 +3466,7 @@
         </p:nvSpPr>
         <p:spPr>
           <a:xfrm>
-            <a:off x="4386463" y="2146856"/>
+            <a:off x="4203581" y="1770335"/>
             <a:ext cx="308098" cy="461665"/>
           </a:xfrm>
           <a:prstGeom prst="rect">
@@ -3496,7 +3501,7 @@
         </p:nvSpPr>
         <p:spPr>
           <a:xfrm>
-            <a:off x="6619466" y="390944"/>
+            <a:off x="6436584" y="25181"/>
             <a:ext cx="292068" cy="461665"/>
           </a:xfrm>
           <a:prstGeom prst="rect">
@@ -3517,6 +3522,164 @@
           </a:p>
         </p:txBody>
       </p:sp>
+      <p:sp>
+        <p:nvSpPr>
+          <p:cNvPr id="10" name="TextBox 9">
+            <a:extLst>
+              <a:ext uri="{FF2B5EF4-FFF2-40B4-BE49-F238E27FC236}">
+                <a16:creationId xmlns:a16="http://schemas.microsoft.com/office/drawing/2014/main" id="{5A38E70B-8288-4787-9F2A-D72779536672}"/>
+              </a:ext>
+            </a:extLst>
+          </p:cNvPr>
+          <p:cNvSpPr txBox="1"/>
+          <p:nvPr/>
+        </p:nvSpPr>
+        <p:spPr>
+          <a:xfrm>
+            <a:off x="4344293" y="5627263"/>
+            <a:ext cx="349776" cy="461665"/>
+          </a:xfrm>
+          <a:prstGeom prst="rect">
+            <a:avLst/>
+          </a:prstGeom>
+          <a:noFill/>
+        </p:spPr>
+        <p:txBody>
+          <a:bodyPr wrap="none" rtlCol="0">
+            <a:spAutoFit/>
+          </a:bodyPr>
+          <a:lstStyle/>
+          <a:p>
+            <a:r>
+              <a:rPr lang="en-US" sz="2400" b="1" dirty="0"/>
+              <a:t>u</a:t>
+            </a:r>
+          </a:p>
+        </p:txBody>
+      </p:sp>
+      <p:sp>
+        <p:nvSpPr>
+          <p:cNvPr id="13" name="TextBox 12">
+            <a:extLst>
+              <a:ext uri="{FF2B5EF4-FFF2-40B4-BE49-F238E27FC236}">
+                <a16:creationId xmlns:a16="http://schemas.microsoft.com/office/drawing/2014/main" id="{301B162A-10EB-49C0-93FE-AC43AEB75199}"/>
+              </a:ext>
+            </a:extLst>
+          </p:cNvPr>
+          <p:cNvSpPr txBox="1"/>
+          <p:nvPr/>
+        </p:nvSpPr>
+        <p:spPr>
+          <a:xfrm>
+            <a:off x="7366180" y="192388"/>
+            <a:ext cx="330540" cy="461665"/>
+          </a:xfrm>
+          <a:prstGeom prst="rect">
+            <a:avLst/>
+          </a:prstGeom>
+          <a:noFill/>
+        </p:spPr>
+        <p:txBody>
+          <a:bodyPr wrap="none" rtlCol="0">
+            <a:spAutoFit/>
+          </a:bodyPr>
+          <a:lstStyle/>
+          <a:p>
+            <a:r>
+              <a:rPr lang="en-US" sz="2400" b="1" dirty="0"/>
+              <a:t>v</a:t>
+            </a:r>
+          </a:p>
+        </p:txBody>
+      </p:sp>
+      <p:cxnSp>
+        <p:nvCxnSpPr>
+          <p:cNvPr id="6" name="Straight Arrow Connector 5">
+            <a:extLst>
+              <a:ext uri="{FF2B5EF4-FFF2-40B4-BE49-F238E27FC236}">
+                <a16:creationId xmlns:a16="http://schemas.microsoft.com/office/drawing/2014/main" id="{BE8BF137-6D4B-4DC7-98F4-64E59EAE97CF}"/>
+              </a:ext>
+            </a:extLst>
+          </p:cNvPr>
+          <p:cNvCxnSpPr>
+            <a:cxnSpLocks/>
+          </p:cNvCxnSpPr>
+          <p:nvPr/>
+        </p:nvCxnSpPr>
+        <p:spPr>
+          <a:xfrm>
+            <a:off x="4791821" y="5171543"/>
+            <a:ext cx="0" cy="1338794"/>
+          </a:xfrm>
+          <a:prstGeom prst="straightConnector1">
+            <a:avLst/>
+          </a:prstGeom>
+          <a:ln w="53975">
+            <a:solidFill>
+              <a:srgbClr val="3232FF"/>
+            </a:solidFill>
+            <a:tailEnd type="triangle"/>
+          </a:ln>
+        </p:spPr>
+        <p:style>
+          <a:lnRef idx="1">
+            <a:schemeClr val="accent1"/>
+          </a:lnRef>
+          <a:fillRef idx="0">
+            <a:schemeClr val="accent1"/>
+          </a:fillRef>
+          <a:effectRef idx="0">
+            <a:schemeClr val="accent1"/>
+          </a:effectRef>
+          <a:fontRef idx="minor">
+            <a:schemeClr val="tx1"/>
+          </a:fontRef>
+        </p:style>
+      </p:cxnSp>
+      <p:cxnSp>
+        <p:nvCxnSpPr>
+          <p:cNvPr id="14" name="Straight Arrow Connector 13">
+            <a:extLst>
+              <a:ext uri="{FF2B5EF4-FFF2-40B4-BE49-F238E27FC236}">
+                <a16:creationId xmlns:a16="http://schemas.microsoft.com/office/drawing/2014/main" id="{8739F077-23DF-4717-944B-2D9A283117BA}"/>
+              </a:ext>
+            </a:extLst>
+          </p:cNvPr>
+          <p:cNvCxnSpPr>
+            <a:cxnSpLocks/>
+          </p:cNvCxnSpPr>
+          <p:nvPr/>
+        </p:nvCxnSpPr>
+        <p:spPr>
+          <a:xfrm flipV="1">
+            <a:off x="6344996" y="574537"/>
+            <a:ext cx="2071295" cy="274320"/>
+          </a:xfrm>
+          <a:prstGeom prst="straightConnector1">
+            <a:avLst/>
+          </a:prstGeom>
+          <a:ln w="53975">
+            <a:solidFill>
+              <a:srgbClr val="0000FF"/>
+            </a:solidFill>
+            <a:tailEnd type="triangle"/>
+          </a:ln>
+        </p:spPr>
+        <p:style>
+          <a:lnRef idx="1">
+            <a:schemeClr val="accent1"/>
+          </a:lnRef>
+          <a:fillRef idx="0">
+            <a:schemeClr val="accent1"/>
+          </a:fillRef>
+          <a:effectRef idx="0">
+            <a:schemeClr val="accent1"/>
+          </a:effectRef>
+          <a:fontRef idx="minor">
+            <a:schemeClr val="tx1"/>
+          </a:fontRef>
+        </p:style>
+      </p:cxnSp>
     </p:spTree>
     <p:extLst>
       <p:ext uri="{BB962C8B-B14F-4D97-AF65-F5344CB8AC3E}">

</xml_diff>

<commit_message>
smoke: update smoke figures
</commit_message>
<xml_diff>
--- a/smv/figures/smokegeom_triangulation.pptx
+++ b/smv/figures/smokegeom_triangulation.pptx
@@ -3536,7 +3536,7 @@
         </p:nvSpPr>
         <p:spPr>
           <a:xfrm>
-            <a:off x="4344293" y="5627263"/>
+            <a:off x="4344293" y="6064584"/>
             <a:ext cx="349776" cy="461665"/>
           </a:xfrm>
           <a:prstGeom prst="rect">
@@ -3571,7 +3571,7 @@
         </p:nvSpPr>
         <p:spPr>
           <a:xfrm>
-            <a:off x="7366180" y="192388"/>
+            <a:off x="7670980" y="152632"/>
             <a:ext cx="330540" cy="461665"/>
           </a:xfrm>
           <a:prstGeom prst="rect">
@@ -3680,6 +3680,383 @@
           </a:fontRef>
         </p:style>
       </p:cxnSp>
+      <p:sp>
+        <p:nvSpPr>
+          <p:cNvPr id="2" name="TextBox 1">
+            <a:extLst>
+              <a:ext uri="{FF2B5EF4-FFF2-40B4-BE49-F238E27FC236}">
+                <a16:creationId xmlns:a16="http://schemas.microsoft.com/office/drawing/2014/main" id="{1160E6FF-4614-422B-9C90-2D210A8538F8}"/>
+              </a:ext>
+            </a:extLst>
+          </p:cNvPr>
+          <p:cNvSpPr txBox="1"/>
+          <p:nvPr/>
+        </p:nvSpPr>
+        <p:spPr>
+          <a:xfrm>
+            <a:off x="4555829" y="711697"/>
+            <a:ext cx="381836" cy="369332"/>
+          </a:xfrm>
+          <a:prstGeom prst="rect">
+            <a:avLst/>
+          </a:prstGeom>
+          <a:noFill/>
+        </p:spPr>
+        <p:txBody>
+          <a:bodyPr wrap="none" rtlCol="0">
+            <a:spAutoFit/>
+          </a:bodyPr>
+          <a:lstStyle/>
+          <a:p>
+            <a:r>
+              <a:rPr lang="en-US" b="1" i="1" dirty="0"/>
+              <a:t>p</a:t>
+            </a:r>
+            <a:r>
+              <a:rPr lang="en-US" b="1" i="1" baseline="-25000" dirty="0"/>
+              <a:t>0</a:t>
+            </a:r>
+          </a:p>
+        </p:txBody>
+      </p:sp>
+      <p:sp>
+        <p:nvSpPr>
+          <p:cNvPr id="15" name="TextBox 14">
+            <a:extLst>
+              <a:ext uri="{FF2B5EF4-FFF2-40B4-BE49-F238E27FC236}">
+                <a16:creationId xmlns:a16="http://schemas.microsoft.com/office/drawing/2014/main" id="{E5A81ED2-9533-4870-875D-6CB6F8FD73FF}"/>
+              </a:ext>
+            </a:extLst>
+          </p:cNvPr>
+          <p:cNvSpPr txBox="1"/>
+          <p:nvPr/>
+        </p:nvSpPr>
+        <p:spPr>
+          <a:xfrm>
+            <a:off x="4416680" y="5780657"/>
+            <a:ext cx="381836" cy="369332"/>
+          </a:xfrm>
+          <a:prstGeom prst="rect">
+            <a:avLst/>
+          </a:prstGeom>
+          <a:noFill/>
+        </p:spPr>
+        <p:txBody>
+          <a:bodyPr wrap="none" rtlCol="0">
+            <a:spAutoFit/>
+          </a:bodyPr>
+          <a:lstStyle/>
+          <a:p>
+            <a:r>
+              <a:rPr lang="en-US" b="1" i="1" dirty="0"/>
+              <a:t>p</a:t>
+            </a:r>
+            <a:r>
+              <a:rPr lang="en-US" b="1" i="1" baseline="-25000" dirty="0"/>
+              <a:t>1</a:t>
+            </a:r>
+          </a:p>
+        </p:txBody>
+      </p:sp>
+      <p:sp>
+        <p:nvSpPr>
+          <p:cNvPr id="16" name="TextBox 15">
+            <a:extLst>
+              <a:ext uri="{FF2B5EF4-FFF2-40B4-BE49-F238E27FC236}">
+                <a16:creationId xmlns:a16="http://schemas.microsoft.com/office/drawing/2014/main" id="{B7FA6399-A1B0-493B-87BF-EB00E2F7A159}"/>
+              </a:ext>
+            </a:extLst>
+          </p:cNvPr>
+          <p:cNvSpPr txBox="1"/>
+          <p:nvPr/>
+        </p:nvSpPr>
+        <p:spPr>
+          <a:xfrm>
+            <a:off x="7625828" y="2427854"/>
+            <a:ext cx="344966" cy="369332"/>
+          </a:xfrm>
+          <a:prstGeom prst="rect">
+            <a:avLst/>
+          </a:prstGeom>
+          <a:noFill/>
+        </p:spPr>
+        <p:txBody>
+          <a:bodyPr wrap="none" rtlCol="0">
+            <a:spAutoFit/>
+          </a:bodyPr>
+          <a:lstStyle/>
+          <a:p>
+            <a:r>
+              <a:rPr lang="en-US" b="1" i="1" dirty="0"/>
+              <a:t>p</a:t>
+            </a:r>
+            <a:r>
+              <a:rPr lang="en-US" b="1" i="1" baseline="-25000" dirty="0"/>
+              <a:t>i</a:t>
+            </a:r>
+          </a:p>
+        </p:txBody>
+      </p:sp>
+      <p:sp>
+        <p:nvSpPr>
+          <p:cNvPr id="3" name="Oval 2">
+            <a:extLst>
+              <a:ext uri="{FF2B5EF4-FFF2-40B4-BE49-F238E27FC236}">
+                <a16:creationId xmlns:a16="http://schemas.microsoft.com/office/drawing/2014/main" id="{A190245D-6AEB-4BF5-B47B-BB65588B1B1B}"/>
+              </a:ext>
+            </a:extLst>
+          </p:cNvPr>
+          <p:cNvSpPr/>
+          <p:nvPr/>
+        </p:nvSpPr>
+        <p:spPr>
+          <a:xfrm>
+            <a:off x="7340887" y="622249"/>
+            <a:ext cx="182880" cy="182880"/>
+          </a:xfrm>
+          <a:prstGeom prst="ellipse">
+            <a:avLst/>
+          </a:prstGeom>
+          <a:solidFill>
+            <a:schemeClr val="tx1"/>
+          </a:solidFill>
+          <a:ln>
+            <a:noFill/>
+          </a:ln>
+        </p:spPr>
+        <p:style>
+          <a:lnRef idx="2">
+            <a:schemeClr val="accent1">
+              <a:shade val="50000"/>
+            </a:schemeClr>
+          </a:lnRef>
+          <a:fillRef idx="1">
+            <a:schemeClr val="accent1"/>
+          </a:fillRef>
+          <a:effectRef idx="0">
+            <a:schemeClr val="accent1"/>
+          </a:effectRef>
+          <a:fontRef idx="minor">
+            <a:schemeClr val="lt1"/>
+          </a:fontRef>
+        </p:style>
+        <p:txBody>
+          <a:bodyPr rtlCol="0" anchor="ctr"/>
+          <a:lstStyle/>
+          <a:p>
+            <a:pPr algn="ctr"/>
+            <a:endParaRPr lang="en-US"/>
+          </a:p>
+        </p:txBody>
+      </p:sp>
+      <p:sp>
+        <p:nvSpPr>
+          <p:cNvPr id="17" name="Oval 16">
+            <a:extLst>
+              <a:ext uri="{FF2B5EF4-FFF2-40B4-BE49-F238E27FC236}">
+                <a16:creationId xmlns:a16="http://schemas.microsoft.com/office/drawing/2014/main" id="{4A134AB1-4EFF-4E9F-A42D-689E8804CF6D}"/>
+              </a:ext>
+            </a:extLst>
+          </p:cNvPr>
+          <p:cNvSpPr/>
+          <p:nvPr/>
+        </p:nvSpPr>
+        <p:spPr>
+          <a:xfrm>
+            <a:off x="4831910" y="986883"/>
+            <a:ext cx="182880" cy="182880"/>
+          </a:xfrm>
+          <a:prstGeom prst="ellipse">
+            <a:avLst/>
+          </a:prstGeom>
+          <a:solidFill>
+            <a:schemeClr val="tx1"/>
+          </a:solidFill>
+          <a:ln>
+            <a:noFill/>
+          </a:ln>
+        </p:spPr>
+        <p:style>
+          <a:lnRef idx="2">
+            <a:schemeClr val="accent1">
+              <a:shade val="50000"/>
+            </a:schemeClr>
+          </a:lnRef>
+          <a:fillRef idx="1">
+            <a:schemeClr val="accent1"/>
+          </a:fillRef>
+          <a:effectRef idx="0">
+            <a:schemeClr val="accent1"/>
+          </a:effectRef>
+          <a:fontRef idx="minor">
+            <a:schemeClr val="lt1"/>
+          </a:fontRef>
+        </p:style>
+        <p:txBody>
+          <a:bodyPr rtlCol="0" anchor="ctr"/>
+          <a:lstStyle/>
+          <a:p>
+            <a:pPr algn="ctr"/>
+            <a:endParaRPr lang="en-US"/>
+          </a:p>
+        </p:txBody>
+      </p:sp>
+      <p:sp>
+        <p:nvSpPr>
+          <p:cNvPr id="18" name="Oval 17">
+            <a:extLst>
+              <a:ext uri="{FF2B5EF4-FFF2-40B4-BE49-F238E27FC236}">
+                <a16:creationId xmlns:a16="http://schemas.microsoft.com/office/drawing/2014/main" id="{61FFB18C-6B6B-45D8-A6BA-6E3B40341AC0}"/>
+              </a:ext>
+            </a:extLst>
+          </p:cNvPr>
+          <p:cNvSpPr/>
+          <p:nvPr/>
+        </p:nvSpPr>
+        <p:spPr>
+          <a:xfrm>
+            <a:off x="4700381" y="5929656"/>
+            <a:ext cx="182880" cy="182880"/>
+          </a:xfrm>
+          <a:prstGeom prst="ellipse">
+            <a:avLst/>
+          </a:prstGeom>
+          <a:solidFill>
+            <a:schemeClr val="tx1"/>
+          </a:solidFill>
+          <a:ln>
+            <a:noFill/>
+          </a:ln>
+        </p:spPr>
+        <p:style>
+          <a:lnRef idx="2">
+            <a:schemeClr val="accent1">
+              <a:shade val="50000"/>
+            </a:schemeClr>
+          </a:lnRef>
+          <a:fillRef idx="1">
+            <a:schemeClr val="accent1"/>
+          </a:fillRef>
+          <a:effectRef idx="0">
+            <a:schemeClr val="accent1"/>
+          </a:effectRef>
+          <a:fontRef idx="minor">
+            <a:schemeClr val="lt1"/>
+          </a:fontRef>
+        </p:style>
+        <p:txBody>
+          <a:bodyPr rtlCol="0" anchor="ctr"/>
+          <a:lstStyle/>
+          <a:p>
+            <a:pPr algn="ctr"/>
+            <a:endParaRPr lang="en-US"/>
+          </a:p>
+        </p:txBody>
+      </p:sp>
+      <p:sp>
+        <p:nvSpPr>
+          <p:cNvPr id="19" name="Oval 18">
+            <a:extLst>
+              <a:ext uri="{FF2B5EF4-FFF2-40B4-BE49-F238E27FC236}">
+                <a16:creationId xmlns:a16="http://schemas.microsoft.com/office/drawing/2014/main" id="{709432E0-C228-4199-A656-1EA8FD4A3E6E}"/>
+              </a:ext>
+            </a:extLst>
+          </p:cNvPr>
+          <p:cNvSpPr/>
+          <p:nvPr/>
+        </p:nvSpPr>
+        <p:spPr>
+          <a:xfrm>
+            <a:off x="6004560" y="6112536"/>
+            <a:ext cx="182880" cy="182880"/>
+          </a:xfrm>
+          <a:prstGeom prst="ellipse">
+            <a:avLst/>
+          </a:prstGeom>
+          <a:solidFill>
+            <a:schemeClr val="tx1"/>
+          </a:solidFill>
+          <a:ln>
+            <a:noFill/>
+          </a:ln>
+        </p:spPr>
+        <p:style>
+          <a:lnRef idx="2">
+            <a:schemeClr val="accent1">
+              <a:shade val="50000"/>
+            </a:schemeClr>
+          </a:lnRef>
+          <a:fillRef idx="1">
+            <a:schemeClr val="accent1"/>
+          </a:fillRef>
+          <a:effectRef idx="0">
+            <a:schemeClr val="accent1"/>
+          </a:effectRef>
+          <a:fontRef idx="minor">
+            <a:schemeClr val="lt1"/>
+          </a:fontRef>
+        </p:style>
+        <p:txBody>
+          <a:bodyPr rtlCol="0" anchor="ctr"/>
+          <a:lstStyle/>
+          <a:p>
+            <a:pPr algn="ctr"/>
+            <a:endParaRPr lang="en-US"/>
+          </a:p>
+        </p:txBody>
+      </p:sp>
+      <p:sp>
+        <p:nvSpPr>
+          <p:cNvPr id="20" name="Oval 19">
+            <a:extLst>
+              <a:ext uri="{FF2B5EF4-FFF2-40B4-BE49-F238E27FC236}">
+                <a16:creationId xmlns:a16="http://schemas.microsoft.com/office/drawing/2014/main" id="{4D96045B-92CC-4EC0-A7AC-8F316FFCF7DE}"/>
+              </a:ext>
+            </a:extLst>
+          </p:cNvPr>
+          <p:cNvSpPr/>
+          <p:nvPr/>
+        </p:nvSpPr>
+        <p:spPr>
+          <a:xfrm>
+            <a:off x="7380643" y="2521080"/>
+            <a:ext cx="182880" cy="182880"/>
+          </a:xfrm>
+          <a:prstGeom prst="ellipse">
+            <a:avLst/>
+          </a:prstGeom>
+          <a:solidFill>
+            <a:schemeClr val="tx1"/>
+          </a:solidFill>
+          <a:ln>
+            <a:noFill/>
+          </a:ln>
+        </p:spPr>
+        <p:style>
+          <a:lnRef idx="2">
+            <a:schemeClr val="accent1">
+              <a:shade val="50000"/>
+            </a:schemeClr>
+          </a:lnRef>
+          <a:fillRef idx="1">
+            <a:schemeClr val="accent1"/>
+          </a:fillRef>
+          <a:effectRef idx="0">
+            <a:schemeClr val="accent1"/>
+          </a:effectRef>
+          <a:fontRef idx="minor">
+            <a:schemeClr val="lt1"/>
+          </a:fontRef>
+        </p:style>
+        <p:txBody>
+          <a:bodyPr rtlCol="0" anchor="ctr"/>
+          <a:lstStyle/>
+          <a:p>
+            <a:pPr algn="ctr"/>
+            <a:endParaRPr lang="en-US"/>
+          </a:p>
+        </p:txBody>
+      </p:sp>
     </p:spTree>
     <p:extLst>
       <p:ext uri="{BB962C8B-B14F-4D97-AF65-F5344CB8AC3E}">

</xml_diff>